<commit_message>
3. SOAP WS Standards Concepts The relation between WS Security & Apache CXF. closes #16.
</commit_message>
<xml_diff>
--- a/3. SOAP WS Standards Concepts/docs/illustration.pptx
+++ b/3. SOAP WS Standards Concepts/docs/illustration.pptx
@@ -105,6 +105,11 @@
       </a:defRPr>
     </a:lvl9pPr>
   </p:defaultTextStyle>
+  <p:extLst>
+    <p:ext uri="{EFAFB233-063F-42B5-8137-9DF3F51BA10A}">
+      <p15:sldGuideLst xmlns:p15="http://schemas.microsoft.com/office/powerpoint/2012/main"/>
+    </p:ext>
+  </p:extLst>
 </p:presentation>
 </file>
 
@@ -3307,9 +3312,6 @@
               </a:rPr>
               <a:t>Where we put the username &amp; password ?</a:t>
             </a:r>
-            <a:endParaRPr lang="en-US" sz="6000" dirty="0">
-              <a:latin typeface="Raleway ExtraBold" pitchFamily="2" charset="0"/>
-            </a:endParaRPr>
           </a:p>
         </p:txBody>
       </p:sp>
@@ -3532,6 +3534,493 @@
           </a:p>
         </p:txBody>
       </p:sp>
+      <p:sp>
+        <p:nvSpPr>
+          <p:cNvPr id="3" name="Rectangle 2"/>
+          <p:cNvSpPr/>
+          <p:nvPr/>
+        </p:nvSpPr>
+        <p:spPr>
+          <a:xfrm>
+            <a:off x="329184" y="10241280"/>
+            <a:ext cx="4791456" cy="2121408"/>
+          </a:xfrm>
+          <a:prstGeom prst="rect">
+            <a:avLst/>
+          </a:prstGeom>
+          <a:ln>
+            <a:noFill/>
+          </a:ln>
+        </p:spPr>
+        <p:style>
+          <a:lnRef idx="2">
+            <a:schemeClr val="accent1">
+              <a:shade val="50000"/>
+            </a:schemeClr>
+          </a:lnRef>
+          <a:fillRef idx="1">
+            <a:schemeClr val="accent1"/>
+          </a:fillRef>
+          <a:effectRef idx="0">
+            <a:schemeClr val="accent1"/>
+          </a:effectRef>
+          <a:fontRef idx="minor">
+            <a:schemeClr val="lt1"/>
+          </a:fontRef>
+        </p:style>
+        <p:txBody>
+          <a:bodyPr rtlCol="0" anchor="ctr"/>
+          <a:lstStyle/>
+          <a:p>
+            <a:pPr algn="ctr"/>
+            <a:r>
+              <a:rPr lang="en-US" sz="6000" dirty="0" smtClean="0">
+                <a:latin typeface="Raleway ExtraBold" pitchFamily="2" charset="0"/>
+              </a:rPr>
+              <a:t>WS </a:t>
+            </a:r>
+          </a:p>
+          <a:p>
+            <a:pPr algn="ctr"/>
+            <a:r>
+              <a:rPr lang="en-US" sz="6000" dirty="0" smtClean="0">
+                <a:latin typeface="Raleway ExtraBold" pitchFamily="2" charset="0"/>
+              </a:rPr>
+              <a:t>Client</a:t>
+            </a:r>
+            <a:endParaRPr lang="en-US" sz="6000" dirty="0">
+              <a:latin typeface="Raleway ExtraBold" pitchFamily="2" charset="0"/>
+            </a:endParaRPr>
+          </a:p>
+        </p:txBody>
+      </p:sp>
+      <p:sp>
+        <p:nvSpPr>
+          <p:cNvPr id="4" name="Rectangle 3"/>
+          <p:cNvSpPr/>
+          <p:nvPr/>
+        </p:nvSpPr>
+        <p:spPr>
+          <a:xfrm>
+            <a:off x="13094208" y="10241280"/>
+            <a:ext cx="4791456" cy="2121408"/>
+          </a:xfrm>
+          <a:prstGeom prst="rect">
+            <a:avLst/>
+          </a:prstGeom>
+          <a:solidFill>
+            <a:schemeClr val="accent6"/>
+          </a:solidFill>
+          <a:ln>
+            <a:noFill/>
+          </a:ln>
+        </p:spPr>
+        <p:style>
+          <a:lnRef idx="2">
+            <a:schemeClr val="accent1">
+              <a:shade val="50000"/>
+            </a:schemeClr>
+          </a:lnRef>
+          <a:fillRef idx="1">
+            <a:schemeClr val="accent1"/>
+          </a:fillRef>
+          <a:effectRef idx="0">
+            <a:schemeClr val="accent1"/>
+          </a:effectRef>
+          <a:fontRef idx="minor">
+            <a:schemeClr val="lt1"/>
+          </a:fontRef>
+        </p:style>
+        <p:txBody>
+          <a:bodyPr rtlCol="0" anchor="ctr"/>
+          <a:lstStyle/>
+          <a:p>
+            <a:pPr algn="ctr"/>
+            <a:r>
+              <a:rPr lang="en-US" sz="6000" dirty="0" smtClean="0">
+                <a:latin typeface="Raleway ExtraBold" pitchFamily="2" charset="0"/>
+              </a:rPr>
+              <a:t>WS</a:t>
+            </a:r>
+          </a:p>
+          <a:p>
+            <a:pPr algn="ctr"/>
+            <a:r>
+              <a:rPr lang="en-US" sz="6000" dirty="0" smtClean="0">
+                <a:latin typeface="Raleway ExtraBold" pitchFamily="2" charset="0"/>
+              </a:rPr>
+              <a:t>Provider</a:t>
+            </a:r>
+            <a:endParaRPr lang="en-US" sz="6000" dirty="0">
+              <a:latin typeface="Raleway ExtraBold" pitchFamily="2" charset="0"/>
+            </a:endParaRPr>
+          </a:p>
+        </p:txBody>
+      </p:sp>
+      <p:sp>
+        <p:nvSpPr>
+          <p:cNvPr id="5" name="Rectangle 4"/>
+          <p:cNvSpPr/>
+          <p:nvPr/>
+        </p:nvSpPr>
+        <p:spPr>
+          <a:xfrm>
+            <a:off x="329184" y="15148560"/>
+            <a:ext cx="4997196" cy="1566672"/>
+          </a:xfrm>
+          <a:prstGeom prst="rect">
+            <a:avLst/>
+          </a:prstGeom>
+          <a:solidFill>
+            <a:schemeClr val="accent6"/>
+          </a:solidFill>
+          <a:ln>
+            <a:noFill/>
+          </a:ln>
+        </p:spPr>
+        <p:style>
+          <a:lnRef idx="2">
+            <a:schemeClr val="accent1">
+              <a:shade val="50000"/>
+            </a:schemeClr>
+          </a:lnRef>
+          <a:fillRef idx="1">
+            <a:schemeClr val="accent1"/>
+          </a:fillRef>
+          <a:effectRef idx="0">
+            <a:schemeClr val="accent1"/>
+          </a:effectRef>
+          <a:fontRef idx="minor">
+            <a:schemeClr val="lt1"/>
+          </a:fontRef>
+        </p:style>
+        <p:txBody>
+          <a:bodyPr rtlCol="0" anchor="ctr"/>
+          <a:lstStyle/>
+          <a:p>
+            <a:pPr algn="ctr"/>
+            <a:r>
+              <a:rPr lang="en-US" sz="4000" dirty="0" smtClean="0">
+                <a:latin typeface="Raleway ExtraBold" pitchFamily="2" charset="0"/>
+              </a:rPr>
+              <a:t>CXF WSS4J In/Out</a:t>
+            </a:r>
+          </a:p>
+          <a:p>
+            <a:pPr algn="ctr"/>
+            <a:r>
+              <a:rPr lang="en-US" sz="4000" dirty="0" smtClean="0">
+                <a:latin typeface="Raleway ExtraBold" pitchFamily="2" charset="0"/>
+              </a:rPr>
+              <a:t>Interceptors</a:t>
+            </a:r>
+            <a:endParaRPr lang="en-US" sz="4000" dirty="0">
+              <a:latin typeface="Raleway ExtraBold" pitchFamily="2" charset="0"/>
+            </a:endParaRPr>
+          </a:p>
+        </p:txBody>
+      </p:sp>
+      <p:sp>
+        <p:nvSpPr>
+          <p:cNvPr id="7" name="Rectangle 6"/>
+          <p:cNvSpPr/>
+          <p:nvPr/>
+        </p:nvSpPr>
+        <p:spPr>
+          <a:xfrm>
+            <a:off x="7842145" y="15148560"/>
+            <a:ext cx="2530557" cy="1566672"/>
+          </a:xfrm>
+          <a:prstGeom prst="rect">
+            <a:avLst/>
+          </a:prstGeom>
+          <a:solidFill>
+            <a:schemeClr val="accent6"/>
+          </a:solidFill>
+          <a:ln>
+            <a:noFill/>
+          </a:ln>
+        </p:spPr>
+        <p:style>
+          <a:lnRef idx="2">
+            <a:schemeClr val="accent1">
+              <a:shade val="50000"/>
+            </a:schemeClr>
+          </a:lnRef>
+          <a:fillRef idx="1">
+            <a:schemeClr val="accent1"/>
+          </a:fillRef>
+          <a:effectRef idx="0">
+            <a:schemeClr val="accent1"/>
+          </a:effectRef>
+          <a:fontRef idx="minor">
+            <a:schemeClr val="lt1"/>
+          </a:fontRef>
+        </p:style>
+        <p:txBody>
+          <a:bodyPr rtlCol="0" anchor="ctr"/>
+          <a:lstStyle/>
+          <a:p>
+            <a:pPr algn="ctr"/>
+            <a:r>
+              <a:rPr lang="en-US" sz="4800" dirty="0" smtClean="0">
+                <a:latin typeface="Raleway ExtraBold" pitchFamily="2" charset="0"/>
+              </a:rPr>
+              <a:t>WSS4J</a:t>
+            </a:r>
+            <a:endParaRPr lang="en-US" sz="4800" dirty="0">
+              <a:latin typeface="Raleway ExtraBold" pitchFamily="2" charset="0"/>
+            </a:endParaRPr>
+          </a:p>
+        </p:txBody>
+      </p:sp>
+      <p:sp>
+        <p:nvSpPr>
+          <p:cNvPr id="8" name="Rectangle 7"/>
+          <p:cNvSpPr/>
+          <p:nvPr/>
+        </p:nvSpPr>
+        <p:spPr>
+          <a:xfrm>
+            <a:off x="12888467" y="15148560"/>
+            <a:ext cx="4997196" cy="1566672"/>
+          </a:xfrm>
+          <a:prstGeom prst="rect">
+            <a:avLst/>
+          </a:prstGeom>
+          <a:solidFill>
+            <a:schemeClr val="accent6"/>
+          </a:solidFill>
+          <a:ln>
+            <a:noFill/>
+          </a:ln>
+        </p:spPr>
+        <p:style>
+          <a:lnRef idx="2">
+            <a:schemeClr val="accent1">
+              <a:shade val="50000"/>
+            </a:schemeClr>
+          </a:lnRef>
+          <a:fillRef idx="1">
+            <a:schemeClr val="accent1"/>
+          </a:fillRef>
+          <a:effectRef idx="0">
+            <a:schemeClr val="accent1"/>
+          </a:effectRef>
+          <a:fontRef idx="minor">
+            <a:schemeClr val="lt1"/>
+          </a:fontRef>
+        </p:style>
+        <p:txBody>
+          <a:bodyPr rtlCol="0" anchor="ctr"/>
+          <a:lstStyle/>
+          <a:p>
+            <a:pPr algn="ctr"/>
+            <a:r>
+              <a:rPr lang="en-US" sz="4000" dirty="0" smtClean="0">
+                <a:latin typeface="Raleway ExtraBold" pitchFamily="2" charset="0"/>
+              </a:rPr>
+              <a:t>CXF WSS4J In/Out</a:t>
+            </a:r>
+          </a:p>
+          <a:p>
+            <a:pPr algn="ctr"/>
+            <a:r>
+              <a:rPr lang="en-US" sz="4000" dirty="0" smtClean="0">
+                <a:latin typeface="Raleway ExtraBold" pitchFamily="2" charset="0"/>
+              </a:rPr>
+              <a:t>Interceptors</a:t>
+            </a:r>
+            <a:endParaRPr lang="en-US" sz="4000" dirty="0">
+              <a:latin typeface="Raleway ExtraBold" pitchFamily="2" charset="0"/>
+            </a:endParaRPr>
+          </a:p>
+        </p:txBody>
+      </p:sp>
+      <p:cxnSp>
+        <p:nvCxnSpPr>
+          <p:cNvPr id="9" name="Connecteur droit avec flèche 8"/>
+          <p:cNvCxnSpPr/>
+          <p:nvPr/>
+        </p:nvCxnSpPr>
+        <p:spPr>
+          <a:xfrm>
+            <a:off x="5795592" y="15912846"/>
+            <a:ext cx="1577340" cy="17526"/>
+          </a:xfrm>
+          <a:prstGeom prst="straightConnector1">
+            <a:avLst/>
+          </a:prstGeom>
+          <a:ln w="190500">
+            <a:solidFill>
+              <a:schemeClr val="accent2"/>
+            </a:solidFill>
+            <a:tailEnd type="triangle"/>
+          </a:ln>
+        </p:spPr>
+        <p:style>
+          <a:lnRef idx="1">
+            <a:schemeClr val="accent1"/>
+          </a:lnRef>
+          <a:fillRef idx="0">
+            <a:schemeClr val="accent1"/>
+          </a:fillRef>
+          <a:effectRef idx="0">
+            <a:schemeClr val="accent1"/>
+          </a:effectRef>
+          <a:fontRef idx="minor">
+            <a:schemeClr val="tx1"/>
+          </a:fontRef>
+        </p:style>
+      </p:cxnSp>
+      <p:cxnSp>
+        <p:nvCxnSpPr>
+          <p:cNvPr id="12" name="Connecteur droit avec flèche 11"/>
+          <p:cNvCxnSpPr/>
+          <p:nvPr/>
+        </p:nvCxnSpPr>
+        <p:spPr>
+          <a:xfrm flipH="1">
+            <a:off x="10841914" y="15895320"/>
+            <a:ext cx="1577340" cy="17526"/>
+          </a:xfrm>
+          <a:prstGeom prst="straightConnector1">
+            <a:avLst/>
+          </a:prstGeom>
+          <a:ln w="190500">
+            <a:solidFill>
+              <a:schemeClr val="accent2"/>
+            </a:solidFill>
+            <a:tailEnd type="triangle"/>
+          </a:ln>
+        </p:spPr>
+        <p:style>
+          <a:lnRef idx="1">
+            <a:schemeClr val="accent1"/>
+          </a:lnRef>
+          <a:fillRef idx="0">
+            <a:schemeClr val="accent1"/>
+          </a:fillRef>
+          <a:effectRef idx="0">
+            <a:schemeClr val="accent1"/>
+          </a:effectRef>
+          <a:fontRef idx="minor">
+            <a:schemeClr val="tx1"/>
+          </a:fontRef>
+        </p:style>
+      </p:cxnSp>
+      <p:cxnSp>
+        <p:nvCxnSpPr>
+          <p:cNvPr id="13" name="Connecteur droit avec flèche 12"/>
+          <p:cNvCxnSpPr/>
+          <p:nvPr/>
+        </p:nvCxnSpPr>
+        <p:spPr>
+          <a:xfrm flipH="1">
+            <a:off x="2702052" y="12527280"/>
+            <a:ext cx="22860" cy="2331720"/>
+          </a:xfrm>
+          <a:prstGeom prst="straightConnector1">
+            <a:avLst/>
+          </a:prstGeom>
+          <a:ln w="190500">
+            <a:solidFill>
+              <a:schemeClr val="accent2"/>
+            </a:solidFill>
+            <a:tailEnd type="triangle"/>
+          </a:ln>
+        </p:spPr>
+        <p:style>
+          <a:lnRef idx="1">
+            <a:schemeClr val="accent1"/>
+          </a:lnRef>
+          <a:fillRef idx="0">
+            <a:schemeClr val="accent1"/>
+          </a:fillRef>
+          <a:effectRef idx="0">
+            <a:schemeClr val="accent1"/>
+          </a:effectRef>
+          <a:fontRef idx="minor">
+            <a:schemeClr val="tx1"/>
+          </a:fontRef>
+        </p:style>
+      </p:cxnSp>
+      <p:cxnSp>
+        <p:nvCxnSpPr>
+          <p:cNvPr id="17" name="Connecteur droit avec flèche 16"/>
+          <p:cNvCxnSpPr/>
+          <p:nvPr/>
+        </p:nvCxnSpPr>
+        <p:spPr>
+          <a:xfrm flipV="1">
+            <a:off x="15656052" y="12527280"/>
+            <a:ext cx="22860" cy="2331720"/>
+          </a:xfrm>
+          <a:prstGeom prst="straightConnector1">
+            <a:avLst/>
+          </a:prstGeom>
+          <a:ln w="190500">
+            <a:solidFill>
+              <a:schemeClr val="accent2"/>
+            </a:solidFill>
+            <a:tailEnd type="triangle"/>
+          </a:ln>
+        </p:spPr>
+        <p:style>
+          <a:lnRef idx="1">
+            <a:schemeClr val="accent1"/>
+          </a:lnRef>
+          <a:fillRef idx="0">
+            <a:schemeClr val="accent1"/>
+          </a:fillRef>
+          <a:effectRef idx="0">
+            <a:schemeClr val="accent1"/>
+          </a:effectRef>
+          <a:fontRef idx="minor">
+            <a:schemeClr val="tx1"/>
+          </a:fontRef>
+        </p:style>
+      </p:cxnSp>
+      <p:cxnSp>
+        <p:nvCxnSpPr>
+          <p:cNvPr id="27" name="Connecteur en angle 26"/>
+          <p:cNvCxnSpPr>
+            <a:stCxn id="5" idx="2"/>
+            <a:endCxn id="8" idx="2"/>
+          </p:cNvCxnSpPr>
+          <p:nvPr/>
+        </p:nvCxnSpPr>
+        <p:spPr>
+          <a:xfrm rot="16200000" flipH="1">
+            <a:off x="9107423" y="10435590"/>
+            <a:ext cx="12700" cy="12559283"/>
+          </a:xfrm>
+          <a:prstGeom prst="bentConnector3">
+            <a:avLst>
+              <a:gd name="adj1" fmla="val 11160000"/>
+            </a:avLst>
+          </a:prstGeom>
+          <a:ln w="190500">
+            <a:solidFill>
+              <a:schemeClr val="accent2"/>
+            </a:solidFill>
+          </a:ln>
+        </p:spPr>
+        <p:style>
+          <a:lnRef idx="1">
+            <a:schemeClr val="accent1"/>
+          </a:lnRef>
+          <a:fillRef idx="0">
+            <a:schemeClr val="accent1"/>
+          </a:fillRef>
+          <a:effectRef idx="0">
+            <a:schemeClr val="accent1"/>
+          </a:effectRef>
+          <a:fontRef idx="minor">
+            <a:schemeClr val="tx1"/>
+          </a:fontRef>
+        </p:style>
+      </p:cxnSp>
     </p:spTree>
     <p:extLst>
       <p:ext uri="{BB962C8B-B14F-4D97-AF65-F5344CB8AC3E}">

</xml_diff>